<commit_message>
Prepare for smoke test work
</commit_message>
<xml_diff>
--- a/CICD_proposal.pptx
+++ b/CICD_proposal.pptx
@@ -109,6 +109,11 @@
       </a:defRPr>
     </a:lvl9pPr>
   </p:defaultTextStyle>
+  <p:extLst>
+    <p:ext uri="{EFAFB233-063F-42B5-8137-9DF3F51BA10A}">
+      <p15:sldGuideLst xmlns:p15="http://schemas.microsoft.com/office/powerpoint/2012/main"/>
+    </p:ext>
+  </p:extLst>
 </p:presentation>
 </file>
 
@@ -251,7 +256,7 @@
           <a:p>
             <a:fld id="{48A87A34-81AB-432B-8DAE-1953F412C126}" type="datetimeFigureOut">
               <a:rPr lang="en-US" dirty="0"/>
-              <a:t>10/1/21</a:t>
+              <a:t>10/2/21</a:t>
             </a:fld>
             <a:endParaRPr lang="en-US" dirty="0"/>
           </a:p>
@@ -457,7 +462,7 @@
           <a:p>
             <a:fld id="{48A87A34-81AB-432B-8DAE-1953F412C126}" type="datetimeFigureOut">
               <a:rPr lang="en-US" dirty="0"/>
-              <a:t>10/1/21</a:t>
+              <a:t>10/2/21</a:t>
             </a:fld>
             <a:endParaRPr lang="en-US" dirty="0"/>
           </a:p>
@@ -667,7 +672,7 @@
           <a:p>
             <a:fld id="{48A87A34-81AB-432B-8DAE-1953F412C126}" type="datetimeFigureOut">
               <a:rPr lang="en-US" dirty="0"/>
-              <a:t>10/1/21</a:t>
+              <a:t>10/2/21</a:t>
             </a:fld>
             <a:endParaRPr lang="en-US" dirty="0"/>
           </a:p>
@@ -863,7 +868,7 @@
           <a:p>
             <a:fld id="{48A87A34-81AB-432B-8DAE-1953F412C126}" type="datetimeFigureOut">
               <a:rPr lang="en-US" dirty="0"/>
-              <a:t>10/1/21</a:t>
+              <a:t>10/2/21</a:t>
             </a:fld>
             <a:endParaRPr lang="en-US" dirty="0"/>
           </a:p>
@@ -1137,7 +1142,7 @@
           <a:p>
             <a:fld id="{48A87A34-81AB-432B-8DAE-1953F412C126}" type="datetimeFigureOut">
               <a:rPr lang="en-US" dirty="0"/>
-              <a:t>10/1/21</a:t>
+              <a:t>10/2/21</a:t>
             </a:fld>
             <a:endParaRPr lang="en-US" dirty="0"/>
           </a:p>
@@ -1400,7 +1405,7 @@
           <a:p>
             <a:fld id="{48A87A34-81AB-432B-8DAE-1953F412C126}" type="datetimeFigureOut">
               <a:rPr lang="en-US" dirty="0"/>
-              <a:t>10/1/21</a:t>
+              <a:t>10/2/21</a:t>
             </a:fld>
             <a:endParaRPr lang="en-US" dirty="0"/>
           </a:p>
@@ -1811,7 +1816,7 @@
           <a:p>
             <a:fld id="{48A87A34-81AB-432B-8DAE-1953F412C126}" type="datetimeFigureOut">
               <a:rPr lang="en-US" dirty="0"/>
-              <a:t>10/1/21</a:t>
+              <a:t>10/2/21</a:t>
             </a:fld>
             <a:endParaRPr lang="en-US" dirty="0"/>
           </a:p>
@@ -1955,7 +1960,7 @@
           <a:p>
             <a:fld id="{48A87A34-81AB-432B-8DAE-1953F412C126}" type="datetimeFigureOut">
               <a:rPr lang="en-US" dirty="0"/>
-              <a:t>10/1/21</a:t>
+              <a:t>10/2/21</a:t>
             </a:fld>
             <a:endParaRPr lang="en-US" dirty="0"/>
           </a:p>
@@ -2076,7 +2081,7 @@
           <a:p>
             <a:fld id="{48A87A34-81AB-432B-8DAE-1953F412C126}" type="datetimeFigureOut">
               <a:rPr lang="en-US" dirty="0"/>
-              <a:t>10/1/21</a:t>
+              <a:t>10/2/21</a:t>
             </a:fld>
             <a:endParaRPr lang="en-US" dirty="0"/>
           </a:p>
@@ -2322,7 +2327,7 @@
           <a:p>
             <a:fld id="{48A87A34-81AB-432B-8DAE-1953F412C126}" type="datetimeFigureOut">
               <a:rPr lang="en-US" dirty="0"/>
-              <a:t>10/1/21</a:t>
+              <a:t>10/2/21</a:t>
             </a:fld>
             <a:endParaRPr lang="en-US" dirty="0"/>
           </a:p>
@@ -2763,7 +2768,7 @@
             <a:fld id="{48A87A34-81AB-432B-8DAE-1953F412C126}" type="datetimeFigureOut">
               <a:rPr lang="en-US" dirty="0"/>
               <a:pPr/>
-              <a:t>10/1/21</a:t>
+              <a:t>10/2/21</a:t>
             </a:fld>
             <a:endParaRPr lang="en-US" dirty="0"/>
           </a:p>
@@ -3086,7 +3091,7 @@
             <a:fld id="{48A87A34-81AB-432B-8DAE-1953F412C126}" type="datetimeFigureOut">
               <a:rPr lang="en-US" dirty="0"/>
               <a:pPr/>
-              <a:t>10/1/21</a:t>
+              <a:t>10/2/21</a:t>
             </a:fld>
             <a:endParaRPr lang="en-US" dirty="0"/>
           </a:p>
@@ -3723,7 +3728,7 @@
         </p:blipFill>
         <p:spPr>
           <a:xfrm>
-            <a:off x="1450975" y="2411401"/>
+            <a:off x="1424424" y="2012007"/>
             <a:ext cx="9217025" cy="2551843"/>
           </a:xfrm>
         </p:spPr>
@@ -3742,8 +3747,8 @@
         </p:nvSpPr>
         <p:spPr>
           <a:xfrm>
-            <a:off x="115614" y="5307724"/>
-            <a:ext cx="12076386" cy="646331"/>
+            <a:off x="115614" y="4791413"/>
+            <a:ext cx="12076386" cy="1200329"/>
           </a:xfrm>
           <a:prstGeom prst="rect">
             <a:avLst/>
@@ -3772,7 +3777,17 @@
             </a:pPr>
             <a:r>
               <a:rPr lang="en-US" dirty="0"/>
-              <a:t>Allows engineers to focus on providing smaller chunks of value to clients at a quick pace</a:t>
+              <a:t>Allows engineers to focus on providing smaller chunks of value to clients at a quick pace by reducing the time spent by engineers manually error checking, monitoring, deploying the product.  </a:t>
+            </a:r>
+          </a:p>
+          <a:p>
+            <a:pPr marL="285750" indent="-285750">
+              <a:buFont typeface="Arial" panose="020B0604020202020204" pitchFamily="34" charset="0"/>
+              <a:buChar char="•"/>
+            </a:pPr>
+            <a:r>
+              <a:rPr lang="en-US" dirty="0"/>
+              <a:t>Less engineering time reduces costs and increase productivity!</a:t>
             </a:r>
           </a:p>
         </p:txBody>
@@ -3856,14 +3871,14 @@
             <p:ph idx="1"/>
             <p:extLst>
               <p:ext uri="{D42A27DB-BD31-4B8C-83A1-F6EECF244321}">
-                <p14:modId xmlns:p14="http://schemas.microsoft.com/office/powerpoint/2010/main" val="3104480832"/>
+                <p14:modId xmlns:p14="http://schemas.microsoft.com/office/powerpoint/2010/main" val="1793360874"/>
               </p:ext>
             </p:extLst>
           </p:nvPr>
         </p:nvGraphicFramePr>
         <p:xfrm>
           <a:off x="1271888" y="1033945"/>
-          <a:ext cx="9962655" cy="4665096"/>
+          <a:ext cx="9962655" cy="4754880"/>
         </p:xfrm>
         <a:graphic>
           <a:graphicData uri="http://schemas.openxmlformats.org/drawingml/2006/table">
@@ -3958,7 +3973,7 @@
                     <a:p>
                       <a:r>
                         <a:rPr lang="en-US" sz="1600" dirty="0"/>
-                        <a:t>Increases predictability, which facilitates planning and meeting goals.  Which ultimately controls costs</a:t>
+                        <a:t>Increases predictability, which facilitates planning and meeting goals,  and ultimately controls costs</a:t>
                       </a:r>
                     </a:p>
                   </a:txBody>
@@ -4008,7 +4023,7 @@
                     <a:p>
                       <a:r>
                         <a:rPr lang="en-US" sz="1600" dirty="0"/>
-                        <a:t>Reduces time to delivery to clients.  Improves customer satisfaction.</a:t>
+                        <a:t>Reduces time to delivery to clients.  Improves customer satisfaction, which protects revenue.</a:t>
                       </a:r>
                     </a:p>
                   </a:txBody>
@@ -4058,7 +4073,7 @@
                     <a:p>
                       <a:r>
                         <a:rPr lang="en-US" sz="1600" dirty="0"/>
-                        <a:t>Allows us to revert to previous working application in case of errors.  Reduces downtime and saves money.</a:t>
+                        <a:t>Enables the ability to revert to a previous working application in case of errors.  Reduces downtime and saves money.</a:t>
                       </a:r>
                     </a:p>
                   </a:txBody>
@@ -4266,7 +4281,7 @@
                     <a:p>
                       <a:r>
                         <a:rPr lang="en-US" sz="1600" dirty="0"/>
-                        <a:t>Encourages practices that reduce errors, which reduces costs.</a:t>
+                        <a:t>Encourages practices that reduce errors, which ultimately reduces costs.</a:t>
                       </a:r>
                     </a:p>
                   </a:txBody>
@@ -4406,28 +4421,34 @@
             <p:ph idx="1"/>
           </p:nvPr>
         </p:nvSpPr>
-        <p:spPr/>
-        <p:txBody>
-          <a:bodyPr/>
-          <a:lstStyle/>
-          <a:p>
-            <a:r>
-              <a:rPr lang="en-US" b="1" dirty="0"/>
-              <a:t>What</a:t>
-            </a:r>
+        <p:spPr>
+          <a:xfrm>
+            <a:off x="1451579" y="1853753"/>
+            <a:ext cx="9603275" cy="4199727"/>
+          </a:xfrm>
+        </p:spPr>
+        <p:txBody>
+          <a:bodyPr>
+            <a:normAutofit fontScale="92500" lnSpcReduction="10000"/>
+          </a:bodyPr>
+          <a:lstStyle/>
+          <a:p>
             <a:r>
               <a:rPr lang="en-US" dirty="0"/>
-              <a:t>:  The practice of merging developers’ code to a shared code repository several times a day</a:t>
-            </a:r>
-          </a:p>
-          <a:p>
-            <a:r>
-              <a:rPr lang="en-US" b="1" dirty="0"/>
-              <a:t>Tools</a:t>
-            </a:r>
+              <a:t>What:  The practice of merging developers’ code to a shared code repository several times a day</a:t>
+            </a:r>
+          </a:p>
+          <a:p>
             <a:r>
               <a:rPr lang="en-US" dirty="0"/>
-              <a:t>:  Git, Gitlab, </a:t>
+              <a:t>Tools:  </a:t>
+            </a:r>
+          </a:p>
+          <a:p>
+            <a:pPr lvl="1"/>
+            <a:r>
+              <a:rPr lang="en-US" dirty="0"/>
+              <a:t>Code Repository &amp; Versioning Tool: Git, Gitlab, </a:t>
             </a:r>
             <a:r>
               <a:rPr lang="en-US" dirty="0" err="1"/>
@@ -4440,12 +4461,8 @@
           </a:p>
           <a:p>
             <a:r>
-              <a:rPr lang="en-US" b="1" dirty="0"/>
-              <a:t>Requirements</a:t>
-            </a:r>
-            <a:r>
               <a:rPr lang="en-US" dirty="0"/>
-              <a:t>:  </a:t>
+              <a:t>Requirements:  </a:t>
             </a:r>
           </a:p>
           <a:p>
@@ -4471,12 +4488,8 @@
           </a:p>
           <a:p>
             <a:r>
-              <a:rPr lang="en-US" b="1" dirty="0"/>
-              <a:t>Impact</a:t>
-            </a:r>
-            <a:r>
               <a:rPr lang="en-US" dirty="0"/>
-              <a:t>:</a:t>
+              <a:t>Impact:  Standardizes code and identify errors early in the process that can be quickly fixed by the person who introduced them.   Improves products and reduces time spent on errors, which controls costs and protects revenue.  </a:t>
             </a:r>
           </a:p>
         </p:txBody>
@@ -4555,101 +4568,105 @@
             <p:ph idx="1"/>
           </p:nvPr>
         </p:nvSpPr>
-        <p:spPr/>
+        <p:spPr>
+          <a:xfrm>
+            <a:off x="1451579" y="2015732"/>
+            <a:ext cx="9603275" cy="3943634"/>
+          </a:xfrm>
+        </p:spPr>
         <p:txBody>
           <a:bodyPr>
-            <a:normAutofit fontScale="85000" lnSpcReduction="20000"/>
+            <a:normAutofit fontScale="70000" lnSpcReduction="20000"/>
           </a:bodyPr>
           <a:lstStyle/>
           <a:p>
             <a:r>
-              <a:rPr lang="en-US" b="1" dirty="0"/>
+              <a:rPr lang="en-US" sz="2300" b="1" dirty="0"/>
               <a:t>What</a:t>
             </a:r>
             <a:r>
-              <a:rPr lang="en-US" dirty="0"/>
+              <a:rPr lang="en-US" sz="2300" dirty="0"/>
               <a:t>:  A software engineering approach in which the value is delivered frequently through automated deployments.</a:t>
             </a:r>
           </a:p>
           <a:p>
             <a:r>
-              <a:rPr lang="en-US" b="1" dirty="0"/>
+              <a:rPr lang="en-US" sz="2300" b="1" dirty="0"/>
               <a:t>Tools</a:t>
             </a:r>
             <a:r>
-              <a:rPr lang="en-US" dirty="0"/>
+              <a:rPr lang="en-US" sz="2300" dirty="0"/>
               <a:t>: </a:t>
             </a:r>
           </a:p>
           <a:p>
             <a:pPr lvl="1"/>
             <a:r>
-              <a:rPr lang="en-US" dirty="0"/>
+              <a:rPr lang="en-US" sz="2100" dirty="0"/>
               <a:t>IAC: CloudFormation (recommended), Terraform</a:t>
             </a:r>
           </a:p>
           <a:p>
             <a:pPr lvl="1"/>
             <a:r>
-              <a:rPr lang="en-US" dirty="0"/>
+              <a:rPr lang="en-US" sz="2100" dirty="0"/>
               <a:t>Monitoring/Logging – </a:t>
             </a:r>
             <a:r>
-              <a:rPr lang="en-US" dirty="0" err="1"/>
+              <a:rPr lang="en-US" sz="2100" dirty="0" err="1"/>
               <a:t>DataDog</a:t>
             </a:r>
             <a:r>
-              <a:rPr lang="en-US" dirty="0"/>
-              <a:t>, </a:t>
+              <a:rPr lang="en-US" sz="2100" dirty="0"/>
+              <a:t>, CloudWatch</a:t>
             </a:r>
           </a:p>
           <a:p>
             <a:pPr lvl="1"/>
             <a:r>
-              <a:rPr lang="en-US" dirty="0"/>
-              <a:t>Alerts: Prometheus (recommended</a:t>
-            </a:r>
-            <a:r>
-              <a:rPr lang="en-US"/>
-              <a:t>), CloudWatch</a:t>
-            </a:r>
-            <a:endParaRPr lang="en-US" dirty="0"/>
-          </a:p>
-          <a:p>
-            <a:r>
-              <a:rPr lang="en-US" b="1" dirty="0"/>
+              <a:rPr lang="en-US" sz="2100" dirty="0"/>
+              <a:t>Alerts: Prometheus (recommended), CloudWatch</a:t>
+            </a:r>
+          </a:p>
+          <a:p>
+            <a:r>
+              <a:rPr lang="en-US" sz="2300" b="1" dirty="0"/>
               <a:t>Requirements</a:t>
             </a:r>
             <a:r>
-              <a:rPr lang="en-US" dirty="0"/>
+              <a:rPr lang="en-US" sz="2300" dirty="0"/>
               <a:t>:</a:t>
             </a:r>
           </a:p>
           <a:p>
             <a:pPr lvl="1"/>
             <a:r>
-              <a:rPr lang="en-US" dirty="0"/>
-              <a:t>Infrastructure as code</a:t>
-            </a:r>
-          </a:p>
-          <a:p>
-            <a:r>
-              <a:rPr lang="en-US" b="1" dirty="0"/>
-              <a:t>Potential Metrics</a:t>
-            </a:r>
-            <a:r>
-              <a:rPr lang="en-US" dirty="0"/>
-              <a:t>:</a:t>
-            </a:r>
-          </a:p>
-          <a:p>
-            <a:r>
-              <a:rPr lang="en-US" b="1" dirty="0"/>
+              <a:rPr lang="en-US" sz="2100" dirty="0"/>
+              <a:t>Determine infrastructure needed to run and consistently deploy infrastructure.   Deploy infrastructure through code. </a:t>
+            </a:r>
+          </a:p>
+          <a:p>
+            <a:pPr lvl="1"/>
+            <a:r>
+              <a:rPr lang="en-US" sz="2100" dirty="0"/>
+              <a:t>Determine a deployment strategy (i.e., Canary,  Blue-Green Candidates)</a:t>
+            </a:r>
+          </a:p>
+          <a:p>
+            <a:pPr lvl="2"/>
+            <a:r>
+              <a:rPr lang="en-US" sz="1800" dirty="0"/>
+              <a:t>Avoids downtime of the application  </a:t>
+            </a:r>
+          </a:p>
+          <a:p>
+            <a:r>
+              <a:rPr lang="en-US" sz="2300" b="1" dirty="0"/>
               <a:t>Impact</a:t>
             </a:r>
             <a:r>
-              <a:rPr lang="en-US" dirty="0"/>
-              <a:t>:</a:t>
+              <a:rPr lang="en-US" sz="2300" dirty="0"/>
+              <a:t>: Repeatable process that avoids downtown time of the application.  Controls costs and protects revenue.</a:t>
             </a:r>
           </a:p>
           <a:p>
@@ -4738,7 +4755,25 @@
           <a:p>
             <a:r>
               <a:rPr lang="en-US" dirty="0"/>
-              <a:t>Drives value</a:t>
+              <a:t>Implementing CI/CD drives business value while reducing costs.</a:t>
+            </a:r>
+          </a:p>
+          <a:p>
+            <a:r>
+              <a:rPr lang="en-US" dirty="0"/>
+              <a:t>It provides consistency around development and deployment which significantly controls costs.</a:t>
+            </a:r>
+          </a:p>
+          <a:p>
+            <a:r>
+              <a:rPr lang="en-US" dirty="0"/>
+              <a:t>Allows engineers to focus on designing features that provide client value, rather than dealing with errors. </a:t>
+            </a:r>
+          </a:p>
+          <a:p>
+            <a:r>
+              <a:rPr lang="en-US" dirty="0"/>
+              <a:t>Support team collaboration, which increases client retention, which also support controlling costs by reducing turnover.</a:t>
             </a:r>
           </a:p>
         </p:txBody>

</xml_diff>